<commit_message>
Prezentacija za sesiju 22
</commit_message>
<xml_diff>
--- a/sesija-22/PPT/Front-End Developer-22.pptx
+++ b/sesija-22/PPT/Front-End Developer-22.pptx
@@ -6,13 +6,23 @@
     <p:sldMasterId id="2147483676" r:id="rId2"/>
   </p:sldMasterIdLst>
   <p:notesMasterIdLst>
-    <p:notesMasterId r:id="rId7"/>
+    <p:notesMasterId r:id="rId17"/>
   </p:notesMasterIdLst>
   <p:sldIdLst>
     <p:sldId id="256" r:id="rId3"/>
     <p:sldId id="257" r:id="rId4"/>
-    <p:sldId id="258" r:id="rId5"/>
-    <p:sldId id="263" r:id="rId6"/>
+    <p:sldId id="264" r:id="rId5"/>
+    <p:sldId id="265" r:id="rId6"/>
+    <p:sldId id="281" r:id="rId7"/>
+    <p:sldId id="290" r:id="rId8"/>
+    <p:sldId id="293" r:id="rId9"/>
+    <p:sldId id="286" r:id="rId10"/>
+    <p:sldId id="295" r:id="rId11"/>
+    <p:sldId id="292" r:id="rId12"/>
+    <p:sldId id="294" r:id="rId13"/>
+    <p:sldId id="291" r:id="rId14"/>
+    <p:sldId id="276" r:id="rId15"/>
+    <p:sldId id="273" r:id="rId16"/>
   </p:sldIdLst>
   <p:sldSz cx="12192000" cy="6858000"/>
   <p:notesSz cx="6858000" cy="9144000"/>
@@ -118,8 +128,18 @@
           <p14:sldIdLst>
             <p14:sldId id="256"/>
             <p14:sldId id="257"/>
-            <p14:sldId id="258"/>
-            <p14:sldId id="263"/>
+            <p14:sldId id="264"/>
+            <p14:sldId id="265"/>
+            <p14:sldId id="281"/>
+            <p14:sldId id="290"/>
+            <p14:sldId id="293"/>
+            <p14:sldId id="286"/>
+            <p14:sldId id="295"/>
+            <p14:sldId id="292"/>
+            <p14:sldId id="294"/>
+            <p14:sldId id="291"/>
+            <p14:sldId id="276"/>
+            <p14:sldId id="273"/>
           </p14:sldIdLst>
         </p14:section>
       </p14:sectionLst>
@@ -903,10 +923,10 @@
         <a:lstStyle/>
         <a:p>
           <a:r>
-            <a:rPr lang="en-US" b="1" smtClean="0"/>
-            <a:t>HTML</a:t>
+            <a:rPr lang="en-US" b="1" dirty="0" smtClean="0"/>
+            <a:t>CSS</a:t>
           </a:r>
-          <a:endParaRPr lang="en-US"/>
+          <a:endParaRPr lang="en-US" dirty="0"/>
         </a:p>
       </dgm:t>
     </dgm:pt>
@@ -931,25 +951,6 @@
           <a:endParaRPr lang="en-US"/>
         </a:p>
       </dgm:t>
-    </dgm:pt>
-    <dgm:pt modelId="{7BA3726F-3900-4FC3-8B1E-5B513F942281}">
-      <dgm:prSet phldrT="[Text]"/>
-      <dgm:spPr/>
-      <dgm:t>
-        <a:bodyPr/>
-        <a:lstStyle/>
-        <a:p>
-          <a:endParaRPr lang="en-US"/>
-        </a:p>
-      </dgm:t>
-    </dgm:pt>
-    <dgm:pt modelId="{F89418B0-7D47-48D3-A0DD-7DC00E292A1E}" type="parTrans" cxnId="{C78D7D1E-4353-489A-8F01-856C716DDAA5}">
-      <dgm:prSet/>
-      <dgm:spPr/>
-    </dgm:pt>
-    <dgm:pt modelId="{B8A6BCFB-F597-4971-BF20-6B7B52347AE9}" type="sibTrans" cxnId="{C78D7D1E-4353-489A-8F01-856C716DDAA5}">
-      <dgm:prSet/>
-      <dgm:spPr/>
     </dgm:pt>
     <dgm:pt modelId="{AEABCDDF-3180-4C76-A7CB-FC0B6AF0719A}" type="pres">
       <dgm:prSet presAssocID="{4EE1351B-4B79-4D48-8F5E-455F7AD945A8}" presName="linear" presStyleCnt="0">
@@ -983,30 +984,12 @@
         </a:p>
       </dgm:t>
     </dgm:pt>
-    <dgm:pt modelId="{AADBD8E6-695F-4FE3-9A02-D807BC812A7C}" type="pres">
-      <dgm:prSet presAssocID="{01EB205F-FC18-44EF-B4D7-07083A382D6D}" presName="childText" presStyleLbl="revTx" presStyleIdx="0" presStyleCnt="1">
-        <dgm:presLayoutVars>
-          <dgm:bulletEnabled val="1"/>
-        </dgm:presLayoutVars>
-      </dgm:prSet>
-      <dgm:spPr/>
-      <dgm:t>
-        <a:bodyPr/>
-        <a:lstStyle/>
-        <a:p>
-          <a:endParaRPr lang="en-US"/>
-        </a:p>
-      </dgm:t>
-    </dgm:pt>
   </dgm:ptLst>
   <dgm:cxnLst>
-    <dgm:cxn modelId="{C5A8E9B4-A897-4242-BCB6-414B02FAC18D}" type="presOf" srcId="{7BA3726F-3900-4FC3-8B1E-5B513F942281}" destId="{AADBD8E6-695F-4FE3-9A02-D807BC812A7C}" srcOrd="0" destOrd="0" presId="urn:microsoft.com/office/officeart/2005/8/layout/vList2"/>
     <dgm:cxn modelId="{FB3F133B-D980-4586-8A93-14087C2AFDB7}" type="presOf" srcId="{01EB205F-FC18-44EF-B4D7-07083A382D6D}" destId="{F4D94EE2-DE87-41D3-8995-9FDA4ED2D4BE}" srcOrd="0" destOrd="0" presId="urn:microsoft.com/office/officeart/2005/8/layout/vList2"/>
-    <dgm:cxn modelId="{C78D7D1E-4353-489A-8F01-856C716DDAA5}" srcId="{01EB205F-FC18-44EF-B4D7-07083A382D6D}" destId="{7BA3726F-3900-4FC3-8B1E-5B513F942281}" srcOrd="0" destOrd="0" parTransId="{F89418B0-7D47-48D3-A0DD-7DC00E292A1E}" sibTransId="{B8A6BCFB-F597-4971-BF20-6B7B52347AE9}"/>
     <dgm:cxn modelId="{554D4833-0D13-4D4C-92BF-76D83AECFDE6}" srcId="{4EE1351B-4B79-4D48-8F5E-455F7AD945A8}" destId="{01EB205F-FC18-44EF-B4D7-07083A382D6D}" srcOrd="0" destOrd="0" parTransId="{D4C6F2B3-566C-488E-AC05-F7BDFB6B7331}" sibTransId="{2BF717F9-FCD3-4CE3-A0A5-83D104AFB328}"/>
     <dgm:cxn modelId="{9ADF0326-01FB-4790-B759-ACDFB0217796}" type="presOf" srcId="{4EE1351B-4B79-4D48-8F5E-455F7AD945A8}" destId="{AEABCDDF-3180-4C76-A7CB-FC0B6AF0719A}" srcOrd="0" destOrd="0" presId="urn:microsoft.com/office/officeart/2005/8/layout/vList2"/>
     <dgm:cxn modelId="{541BD5B9-51DA-497F-838D-CDA31366E980}" type="presParOf" srcId="{AEABCDDF-3180-4C76-A7CB-FC0B6AF0719A}" destId="{F4D94EE2-DE87-41D3-8995-9FDA4ED2D4BE}" srcOrd="0" destOrd="0" presId="urn:microsoft.com/office/officeart/2005/8/layout/vList2"/>
-    <dgm:cxn modelId="{C7801D2E-7067-4E56-86BD-8C707C34363A}" type="presParOf" srcId="{AEABCDDF-3180-4C76-A7CB-FC0B6AF0719A}" destId="{AADBD8E6-695F-4FE3-9A02-D807BC812A7C}" srcOrd="1" destOrd="0" presId="urn:microsoft.com/office/officeart/2005/8/layout/vList2"/>
   </dgm:cxnLst>
   <dgm:bg/>
   <dgm:whole/>
@@ -1033,7 +1016,7 @@
       </dsp:nvSpPr>
       <dsp:spPr>
         <a:xfrm>
-          <a:off x="0" y="1548347"/>
+          <a:off x="0" y="2086548"/>
           <a:ext cx="8298873" cy="1521000"/>
         </a:xfrm>
         <a:prstGeom prst="roundRect">
@@ -1092,72 +1075,15 @@
             </a:spcAft>
           </a:pPr>
           <a:r>
-            <a:rPr lang="en-US" sz="6500" b="1" kern="1200" smtClean="0"/>
-            <a:t>HTML</a:t>
+            <a:rPr lang="en-US" sz="6500" b="1" kern="1200" dirty="0" smtClean="0"/>
+            <a:t>CSS</a:t>
           </a:r>
-          <a:endParaRPr lang="en-US" sz="6500" kern="1200"/>
+          <a:endParaRPr lang="en-US" sz="6500" kern="1200" dirty="0"/>
         </a:p>
       </dsp:txBody>
       <dsp:txXfrm>
-        <a:off x="74249" y="1622596"/>
+        <a:off x="74249" y="2160797"/>
         <a:ext cx="8150375" cy="1372502"/>
-      </dsp:txXfrm>
-    </dsp:sp>
-    <dsp:sp modelId="{AADBD8E6-695F-4FE3-9A02-D807BC812A7C}">
-      <dsp:nvSpPr>
-        <dsp:cNvPr id="0" name=""/>
-        <dsp:cNvSpPr/>
-      </dsp:nvSpPr>
-      <dsp:spPr>
-        <a:xfrm>
-          <a:off x="0" y="3069347"/>
-          <a:ext cx="8298873" cy="1076400"/>
-        </a:xfrm>
-        <a:prstGeom prst="rect">
-          <a:avLst/>
-        </a:prstGeom>
-        <a:noFill/>
-        <a:ln>
-          <a:noFill/>
-        </a:ln>
-        <a:effectLst/>
-      </dsp:spPr>
-      <dsp:style>
-        <a:lnRef idx="0">
-          <a:scrgbClr r="0" g="0" b="0"/>
-        </a:lnRef>
-        <a:fillRef idx="0">
-          <a:scrgbClr r="0" g="0" b="0"/>
-        </a:fillRef>
-        <a:effectRef idx="0">
-          <a:scrgbClr r="0" g="0" b="0"/>
-        </a:effectRef>
-        <a:fontRef idx="minor"/>
-      </dsp:style>
-      <dsp:txBody>
-        <a:bodyPr spcFirstLastPara="0" vert="horz" wrap="square" lIns="263489" tIns="82550" rIns="462280" bIns="82550" numCol="1" spcCol="1270" anchor="t" anchorCtr="0">
-          <a:noAutofit/>
-        </a:bodyPr>
-        <a:lstStyle/>
-        <a:p>
-          <a:pPr marL="285750" lvl="1" indent="-285750" algn="l" defTabSz="2266950">
-            <a:lnSpc>
-              <a:spcPct val="90000"/>
-            </a:lnSpc>
-            <a:spcBef>
-              <a:spcPct val="0"/>
-            </a:spcBef>
-            <a:spcAft>
-              <a:spcPct val="20000"/>
-            </a:spcAft>
-            <a:buChar char="••"/>
-          </a:pPr>
-          <a:endParaRPr lang="en-US" sz="5100" kern="1200"/>
-        </a:p>
-      </dsp:txBody>
-      <dsp:txXfrm>
-        <a:off x="0" y="3069347"/>
-        <a:ext cx="8298873" cy="1076400"/>
       </dsp:txXfrm>
     </dsp:sp>
   </dsp:spTree>
@@ -2447,7 +2373,7 @@
           <a:p>
             <a:fld id="{D32AC403-8EB1-4D4E-8C3A-24BD19820531}" type="datetimeFigureOut">
               <a:rPr lang="en-US" smtClean="0"/>
-              <a:t>13-Mar-18</a:t>
+              <a:t>3/30/2018</a:t>
             </a:fld>
             <a:endParaRPr lang="en-US"/>
           </a:p>
@@ -2715,6 +2641,90 @@
 </p:notesMaster>
 </file>
 
+<file path=ppt/notesSlides/notesSlide1.xml><?xml version="1.0" encoding="utf-8"?>
+<p:notes xmlns:a="http://schemas.openxmlformats.org/drawingml/2006/main" xmlns:r="http://schemas.openxmlformats.org/officeDocument/2006/relationships" xmlns:p="http://schemas.openxmlformats.org/presentationml/2006/main">
+  <p:cSld>
+    <p:spTree>
+      <p:nvGrpSpPr>
+        <p:cNvPr id="1" name=""/>
+        <p:cNvGrpSpPr/>
+        <p:nvPr/>
+      </p:nvGrpSpPr>
+      <p:grpSpPr>
+        <a:xfrm>
+          <a:off x="0" y="0"/>
+          <a:ext cx="0" cy="0"/>
+          <a:chOff x="0" y="0"/>
+          <a:chExt cx="0" cy="0"/>
+        </a:xfrm>
+      </p:grpSpPr>
+      <p:sp>
+        <p:nvSpPr>
+          <p:cNvPr id="2" name="Slide Image Placeholder 1"/>
+          <p:cNvSpPr>
+            <a:spLocks noGrp="1" noRot="1" noChangeAspect="1"/>
+          </p:cNvSpPr>
+          <p:nvPr>
+            <p:ph type="sldImg"/>
+          </p:nvPr>
+        </p:nvSpPr>
+        <p:spPr/>
+      </p:sp>
+      <p:sp>
+        <p:nvSpPr>
+          <p:cNvPr id="3" name="Notes Placeholder 2"/>
+          <p:cNvSpPr>
+            <a:spLocks noGrp="1"/>
+          </p:cNvSpPr>
+          <p:nvPr>
+            <p:ph type="body" idx="1"/>
+          </p:nvPr>
+        </p:nvSpPr>
+        <p:spPr/>
+        <p:txBody>
+          <a:bodyPr/>
+          <a:lstStyle/>
+          <a:p>
+            <a:endParaRPr lang="en-US" dirty="0" smtClean="0"/>
+          </a:p>
+        </p:txBody>
+      </p:sp>
+      <p:sp>
+        <p:nvSpPr>
+          <p:cNvPr id="4" name="Slide Number Placeholder 3"/>
+          <p:cNvSpPr>
+            <a:spLocks noGrp="1"/>
+          </p:cNvSpPr>
+          <p:nvPr>
+            <p:ph type="sldNum" sz="quarter" idx="10"/>
+          </p:nvPr>
+        </p:nvSpPr>
+        <p:spPr/>
+        <p:txBody>
+          <a:bodyPr/>
+          <a:lstStyle/>
+          <a:p>
+            <a:fld id="{C53670EE-8D87-4DCA-A75C-57CFF257AC9C}" type="slidenum">
+              <a:rPr lang="en-US" smtClean="0"/>
+              <a:t>3</a:t>
+            </a:fld>
+            <a:endParaRPr lang="en-US"/>
+          </a:p>
+        </p:txBody>
+      </p:sp>
+    </p:spTree>
+    <p:extLst>
+      <p:ext uri="{BB962C8B-B14F-4D97-AF65-F5344CB8AC3E}">
+        <p14:creationId xmlns:p14="http://schemas.microsoft.com/office/powerpoint/2010/main" val="1070313101"/>
+      </p:ext>
+    </p:extLst>
+  </p:cSld>
+  <p:clrMapOvr>
+    <a:masterClrMapping/>
+  </p:clrMapOvr>
+</p:notes>
+</file>
+
 <file path=ppt/slideLayouts/slideLayout1.xml><?xml version="1.0" encoding="utf-8"?>
 <p:sldLayout xmlns:a="http://schemas.openxmlformats.org/drawingml/2006/main" xmlns:r="http://schemas.openxmlformats.org/officeDocument/2006/relationships" xmlns:p="http://schemas.openxmlformats.org/presentationml/2006/main" type="title">
   <p:cSld name="Title Slide">
@@ -3193,7 +3203,7 @@
           <a:p>
             <a:fld id="{B35B300D-7DF5-4E96-8AA6-60E94C6E9F44}" type="datetimeFigureOut">
               <a:rPr lang="sr-Latn-RS" smtClean="0"/>
-              <a:t>13.3.2018.</a:t>
+              <a:t>30.3.2018.</a:t>
             </a:fld>
             <a:endParaRPr lang="sr-Latn-RS"/>
           </a:p>
@@ -3627,7 +3637,7 @@
           <a:p>
             <a:fld id="{B35B300D-7DF5-4E96-8AA6-60E94C6E9F44}" type="datetimeFigureOut">
               <a:rPr lang="sr-Latn-RS" smtClean="0"/>
-              <a:t>13.3.2018.</a:t>
+              <a:t>30.3.2018.</a:t>
             </a:fld>
             <a:endParaRPr lang="sr-Latn-RS"/>
           </a:p>
@@ -4001,7 +4011,7 @@
           <a:p>
             <a:fld id="{B35B300D-7DF5-4E96-8AA6-60E94C6E9F44}" type="datetimeFigureOut">
               <a:rPr lang="sr-Latn-RS" smtClean="0"/>
-              <a:t>13.3.2018.</a:t>
+              <a:t>30.3.2018.</a:t>
             </a:fld>
             <a:endParaRPr lang="sr-Latn-RS"/>
           </a:p>
@@ -4285,7 +4295,7 @@
           <a:p>
             <a:fld id="{B35B300D-7DF5-4E96-8AA6-60E94C6E9F44}" type="datetimeFigureOut">
               <a:rPr lang="sr-Latn-RS" smtClean="0"/>
-              <a:t>13.3.2018.</a:t>
+              <a:t>30.3.2018.</a:t>
             </a:fld>
             <a:endParaRPr lang="sr-Latn-RS"/>
           </a:p>
@@ -4462,7 +4472,7 @@
           <a:p>
             <a:fld id="{B35B300D-7DF5-4E96-8AA6-60E94C6E9F44}" type="datetimeFigureOut">
               <a:rPr lang="sr-Latn-RS" smtClean="0"/>
-              <a:t>13.3.2018.</a:t>
+              <a:t>30.3.2018.</a:t>
             </a:fld>
             <a:endParaRPr lang="sr-Latn-RS"/>
           </a:p>
@@ -4649,7 +4659,7 @@
           <a:p>
             <a:fld id="{B35B300D-7DF5-4E96-8AA6-60E94C6E9F44}" type="datetimeFigureOut">
               <a:rPr lang="sr-Latn-RS" smtClean="0"/>
-              <a:t>13.3.2018.</a:t>
+              <a:t>30.3.2018.</a:t>
             </a:fld>
             <a:endParaRPr lang="sr-Latn-RS"/>
           </a:p>
@@ -4896,7 +4906,7 @@
           <a:p>
             <a:fld id="{B35B300D-7DF5-4E96-8AA6-60E94C6E9F44}" type="datetimeFigureOut">
               <a:rPr lang="sr-Latn-RS" smtClean="0"/>
-              <a:t>13.3.2018.</a:t>
+              <a:t>30.3.2018.</a:t>
             </a:fld>
             <a:endParaRPr lang="sr-Latn-RS"/>
           </a:p>
@@ -5180,7 +5190,7 @@
           <a:p>
             <a:fld id="{B35B300D-7DF5-4E96-8AA6-60E94C6E9F44}" type="datetimeFigureOut">
               <a:rPr lang="sr-Latn-RS" smtClean="0"/>
-              <a:t>13.3.2018.</a:t>
+              <a:t>30.3.2018.</a:t>
             </a:fld>
             <a:endParaRPr lang="sr-Latn-RS"/>
           </a:p>
@@ -5692,23 +5702,28 @@
           </a:lstStyle>
           <a:p>
             <a:r>
-              <a:rPr lang="en-US" sz="3600" smtClean="0"/>
+              <a:rPr lang="en-US" sz="3600" dirty="0" err="1" smtClean="0"/>
               <a:t>Lekcija</a:t>
             </a:r>
-          </a:p>
-          <a:p>
-            <a:endParaRPr lang="en-US" sz="3600" smtClean="0"/>
-          </a:p>
-          <a:p>
-            <a:r>
-              <a:rPr lang="en-US" sz="3600" smtClean="0"/>
+            <a:endParaRPr lang="en-US" sz="3600" dirty="0" smtClean="0"/>
+          </a:p>
+          <a:p>
+            <a:endParaRPr lang="en-US" sz="3600" dirty="0" smtClean="0"/>
+          </a:p>
+          <a:p>
+            <a:r>
+              <a:rPr lang="en-US" sz="3600" dirty="0" smtClean="0"/>
               <a:t>CSS</a:t>
             </a:r>
             <a:r>
-              <a:rPr lang="en-US" sz="3600" baseline="0" smtClean="0"/>
-              <a:t> - osnove</a:t>
-            </a:r>
-            <a:endParaRPr lang="sr-Latn-RS" sz="3600"/>
+              <a:rPr lang="en-US" sz="3600" baseline="0" dirty="0" smtClean="0"/>
+              <a:t> - </a:t>
+            </a:r>
+            <a:r>
+              <a:rPr lang="en-US" sz="3600" baseline="0" dirty="0" err="1" smtClean="0"/>
+              <a:t>osnove</a:t>
+            </a:r>
+            <a:endParaRPr lang="sr-Latn-RS" sz="3600" dirty="0"/>
           </a:p>
         </p:txBody>
       </p:sp>
@@ -7099,7 +7114,7 @@
           <a:p>
             <a:fld id="{B35B300D-7DF5-4E96-8AA6-60E94C6E9F44}" type="datetimeFigureOut">
               <a:rPr lang="sr-Latn-RS" smtClean="0"/>
-              <a:t>13.3.2018.</a:t>
+              <a:t>30.3.2018.</a:t>
             </a:fld>
             <a:endParaRPr lang="sr-Latn-RS"/>
           </a:p>
@@ -7521,25 +7536,29 @@
           <a:lstStyle/>
           <a:p>
             <a:r>
-              <a:rPr lang="en-US" b="1"/>
+              <a:rPr lang="en-US" b="1" dirty="0"/>
               <a:t>Front-End </a:t>
             </a:r>
             <a:r>
-              <a:rPr lang="en-US" b="1" smtClean="0"/>
+              <a:rPr lang="en-US" b="1" dirty="0" smtClean="0"/>
               <a:t>Developer</a:t>
             </a:r>
             <a:br>
-              <a:rPr lang="en-US" b="1" smtClean="0"/>
+              <a:rPr lang="en-US" b="1" dirty="0" smtClean="0"/>
             </a:br>
             <a:r>
-              <a:rPr lang="en-US" b="1" smtClean="0"/>
+              <a:rPr lang="en-US" b="1" dirty="0" smtClean="0"/>
               <a:t>22 </a:t>
             </a:r>
             <a:r>
-              <a:rPr lang="en-US" b="1" smtClean="0"/>
-              <a:t>– 30.03.2018</a:t>
-            </a:r>
-            <a:endParaRPr lang="en-US"/>
+              <a:rPr lang="en-US" b="1" dirty="0" smtClean="0"/>
+              <a:t>– </a:t>
+            </a:r>
+            <a:r>
+              <a:rPr lang="en-US" b="1" dirty="0" smtClean="0"/>
+              <a:t>30.03.2018</a:t>
+            </a:r>
+            <a:endParaRPr lang="en-US" dirty="0"/>
           </a:p>
         </p:txBody>
       </p:sp>
@@ -7559,10 +7578,14 @@
           <a:lstStyle/>
           <a:p>
             <a:r>
-              <a:rPr lang="en-US" smtClean="0"/>
-              <a:t>Radovan Ostojić</a:t>
-            </a:r>
-            <a:endParaRPr lang="en-US"/>
+              <a:rPr lang="en-US" dirty="0" err="1" smtClean="0"/>
+              <a:t>Sinisa</a:t>
+            </a:r>
+            <a:r>
+              <a:rPr lang="en-US" dirty="0" smtClean="0"/>
+              <a:t> Vrhovac</a:t>
+            </a:r>
+            <a:endParaRPr lang="en-US" dirty="0"/>
           </a:p>
         </p:txBody>
       </p:sp>
@@ -7570,6 +7593,619 @@
     <p:extLst>
       <p:ext uri="{BB962C8B-B14F-4D97-AF65-F5344CB8AC3E}">
         <p14:creationId xmlns:p14="http://schemas.microsoft.com/office/powerpoint/2010/main" val="387546670"/>
+      </p:ext>
+    </p:extLst>
+  </p:cSld>
+  <p:clrMapOvr>
+    <a:masterClrMapping/>
+  </p:clrMapOvr>
+  <p:timing>
+    <p:tnLst>
+      <p:par>
+        <p:cTn id="1" dur="indefinite" restart="never" nodeType="tmRoot"/>
+      </p:par>
+    </p:tnLst>
+  </p:timing>
+</p:sld>
+</file>
+
+<file path=ppt/slides/slide10.xml><?xml version="1.0" encoding="utf-8"?>
+<p:sld xmlns:a="http://schemas.openxmlformats.org/drawingml/2006/main" xmlns:r="http://schemas.openxmlformats.org/officeDocument/2006/relationships" xmlns:p="http://schemas.openxmlformats.org/presentationml/2006/main">
+  <p:cSld>
+    <p:spTree>
+      <p:nvGrpSpPr>
+        <p:cNvPr id="1" name=""/>
+        <p:cNvGrpSpPr/>
+        <p:nvPr/>
+      </p:nvGrpSpPr>
+      <p:grpSpPr>
+        <a:xfrm>
+          <a:off x="0" y="0"/>
+          <a:ext cx="0" cy="0"/>
+          <a:chOff x="0" y="0"/>
+          <a:chExt cx="0" cy="0"/>
+        </a:xfrm>
+      </p:grpSpPr>
+      <p:sp>
+        <p:nvSpPr>
+          <p:cNvPr id="5" name="Title 4"/>
+          <p:cNvSpPr>
+            <a:spLocks noGrp="1"/>
+          </p:cNvSpPr>
+          <p:nvPr>
+            <p:ph type="title"/>
+          </p:nvPr>
+        </p:nvSpPr>
+        <p:spPr/>
+        <p:txBody>
+          <a:bodyPr/>
+          <a:lstStyle/>
+          <a:p>
+            <a:r>
+              <a:rPr lang="en-US" dirty="0" smtClean="0"/>
+              <a:t>Design grid</a:t>
+            </a:r>
+            <a:endParaRPr lang="en-US" dirty="0"/>
+          </a:p>
+        </p:txBody>
+      </p:sp>
+      <p:pic>
+        <p:nvPicPr>
+          <p:cNvPr id="3" name="Content Placeholder 2"/>
+          <p:cNvPicPr>
+            <a:picLocks noGrp="1" noChangeAspect="1"/>
+          </p:cNvPicPr>
+          <p:nvPr>
+            <p:ph sz="quarter" idx="10"/>
+          </p:nvPr>
+        </p:nvPicPr>
+        <p:blipFill>
+          <a:blip r:embed="rId2"/>
+          <a:stretch>
+            <a:fillRect/>
+          </a:stretch>
+        </p:blipFill>
+        <p:spPr>
+          <a:xfrm>
+            <a:off x="609480" y="1418400"/>
+            <a:ext cx="7797803" cy="4489240"/>
+          </a:xfrm>
+          <a:prstGeom prst="rect">
+            <a:avLst/>
+          </a:prstGeom>
+        </p:spPr>
+      </p:pic>
+    </p:spTree>
+    <p:extLst>
+      <p:ext uri="{BB962C8B-B14F-4D97-AF65-F5344CB8AC3E}">
+        <p14:creationId xmlns:p14="http://schemas.microsoft.com/office/powerpoint/2010/main" val="4236901587"/>
+      </p:ext>
+    </p:extLst>
+  </p:cSld>
+  <p:clrMapOvr>
+    <a:masterClrMapping/>
+  </p:clrMapOvr>
+  <p:timing>
+    <p:tnLst>
+      <p:par>
+        <p:cTn id="1" dur="indefinite" restart="never" nodeType="tmRoot"/>
+      </p:par>
+    </p:tnLst>
+  </p:timing>
+</p:sld>
+</file>
+
+<file path=ppt/slides/slide11.xml><?xml version="1.0" encoding="utf-8"?>
+<p:sld xmlns:a="http://schemas.openxmlformats.org/drawingml/2006/main" xmlns:r="http://schemas.openxmlformats.org/officeDocument/2006/relationships" xmlns:p="http://schemas.openxmlformats.org/presentationml/2006/main">
+  <p:cSld>
+    <p:spTree>
+      <p:nvGrpSpPr>
+        <p:cNvPr id="1" name=""/>
+        <p:cNvGrpSpPr/>
+        <p:nvPr/>
+      </p:nvGrpSpPr>
+      <p:grpSpPr>
+        <a:xfrm>
+          <a:off x="0" y="0"/>
+          <a:ext cx="0" cy="0"/>
+          <a:chOff x="0" y="0"/>
+          <a:chExt cx="0" cy="0"/>
+        </a:xfrm>
+      </p:grpSpPr>
+      <p:sp>
+        <p:nvSpPr>
+          <p:cNvPr id="5" name="Title 4"/>
+          <p:cNvSpPr>
+            <a:spLocks noGrp="1"/>
+          </p:cNvSpPr>
+          <p:nvPr>
+            <p:ph type="title"/>
+          </p:nvPr>
+        </p:nvSpPr>
+        <p:spPr/>
+        <p:txBody>
+          <a:bodyPr/>
+          <a:lstStyle/>
+          <a:p>
+            <a:r>
+              <a:rPr lang="en-US" dirty="0" smtClean="0"/>
+              <a:t>Design grid</a:t>
+            </a:r>
+            <a:endParaRPr lang="en-US" dirty="0"/>
+          </a:p>
+        </p:txBody>
+      </p:sp>
+      <p:sp>
+        <p:nvSpPr>
+          <p:cNvPr id="2" name="Content Placeholder 1"/>
+          <p:cNvSpPr>
+            <a:spLocks noGrp="1"/>
+          </p:cNvSpPr>
+          <p:nvPr>
+            <p:ph sz="quarter" idx="10"/>
+          </p:nvPr>
+        </p:nvSpPr>
+        <p:spPr/>
+        <p:txBody>
+          <a:bodyPr/>
+          <a:lstStyle/>
+          <a:p>
+            <a:r>
+              <a:rPr lang="en-US" dirty="0">
+                <a:hlinkClick r:id="rId2"/>
+              </a:rPr>
+              <a:t>http://getbootstrap.com/docs/4.0/examples/grid</a:t>
+            </a:r>
+            <a:r>
+              <a:rPr lang="en-US" dirty="0" smtClean="0">
+                <a:hlinkClick r:id="rId2"/>
+              </a:rPr>
+              <a:t>/</a:t>
+            </a:r>
+            <a:r>
+              <a:rPr lang="en-US" dirty="0" smtClean="0"/>
+              <a:t> </a:t>
+            </a:r>
+          </a:p>
+          <a:p>
+            <a:r>
+              <a:rPr lang="en-US" dirty="0">
+                <a:hlinkClick r:id="rId3"/>
+              </a:rPr>
+              <a:t>http://getbootstrap.com/docs/4.0/examples/jumbotron</a:t>
+            </a:r>
+            <a:r>
+              <a:rPr lang="en-US" dirty="0" smtClean="0">
+                <a:hlinkClick r:id="rId3"/>
+              </a:rPr>
+              <a:t>/</a:t>
+            </a:r>
+            <a:endParaRPr lang="en-US" dirty="0" smtClean="0"/>
+          </a:p>
+          <a:p>
+            <a:r>
+              <a:rPr lang="en-US" dirty="0">
+                <a:hlinkClick r:id="rId4"/>
+              </a:rPr>
+              <a:t>http://getbootstrap.com/docs/4.0/examples/starter-template</a:t>
+            </a:r>
+            <a:r>
+              <a:rPr lang="en-US" dirty="0" smtClean="0">
+                <a:hlinkClick r:id="rId4"/>
+              </a:rPr>
+              <a:t>/</a:t>
+            </a:r>
+            <a:r>
+              <a:rPr lang="en-US" dirty="0" smtClean="0"/>
+              <a:t> </a:t>
+            </a:r>
+            <a:endParaRPr lang="sr-Latn-CS" dirty="0" smtClean="0"/>
+          </a:p>
+          <a:p>
+            <a:r>
+              <a:rPr lang="en-US" dirty="0">
+                <a:hlinkClick r:id="rId5"/>
+              </a:rPr>
+              <a:t>http://getbootstrap.com/docs/4.0/examples/checkout</a:t>
+            </a:r>
+            <a:r>
+              <a:rPr lang="en-US" dirty="0" smtClean="0">
+                <a:hlinkClick r:id="rId5"/>
+              </a:rPr>
+              <a:t>/</a:t>
+            </a:r>
+            <a:r>
+              <a:rPr lang="sr-Latn-CS" dirty="0" smtClean="0"/>
+              <a:t> </a:t>
+            </a:r>
+            <a:endParaRPr lang="en-US" dirty="0"/>
+          </a:p>
+        </p:txBody>
+      </p:sp>
+    </p:spTree>
+    <p:extLst>
+      <p:ext uri="{BB962C8B-B14F-4D97-AF65-F5344CB8AC3E}">
+        <p14:creationId xmlns:p14="http://schemas.microsoft.com/office/powerpoint/2010/main" val="3638353586"/>
+      </p:ext>
+    </p:extLst>
+  </p:cSld>
+  <p:clrMapOvr>
+    <a:masterClrMapping/>
+  </p:clrMapOvr>
+  <p:timing>
+    <p:tnLst>
+      <p:par>
+        <p:cTn id="1" dur="indefinite" restart="never" nodeType="tmRoot"/>
+      </p:par>
+    </p:tnLst>
+  </p:timing>
+</p:sld>
+</file>
+
+<file path=ppt/slides/slide12.xml><?xml version="1.0" encoding="utf-8"?>
+<p:sld xmlns:a="http://schemas.openxmlformats.org/drawingml/2006/main" xmlns:r="http://schemas.openxmlformats.org/officeDocument/2006/relationships" xmlns:p="http://schemas.openxmlformats.org/presentationml/2006/main">
+  <p:cSld>
+    <p:spTree>
+      <p:nvGrpSpPr>
+        <p:cNvPr id="1" name=""/>
+        <p:cNvGrpSpPr/>
+        <p:nvPr/>
+      </p:nvGrpSpPr>
+      <p:grpSpPr>
+        <a:xfrm>
+          <a:off x="0" y="0"/>
+          <a:ext cx="0" cy="0"/>
+          <a:chOff x="0" y="0"/>
+          <a:chExt cx="0" cy="0"/>
+        </a:xfrm>
+      </p:grpSpPr>
+      <p:sp>
+        <p:nvSpPr>
+          <p:cNvPr id="5" name="Title 4"/>
+          <p:cNvSpPr>
+            <a:spLocks noGrp="1"/>
+          </p:cNvSpPr>
+          <p:nvPr>
+            <p:ph type="title"/>
+          </p:nvPr>
+        </p:nvSpPr>
+        <p:spPr/>
+        <p:txBody>
+          <a:bodyPr/>
+          <a:lstStyle/>
+          <a:p>
+            <a:r>
+              <a:rPr lang="sr-Latn-CS" dirty="0" smtClean="0"/>
+              <a:t>Bootstrap responsive</a:t>
+            </a:r>
+            <a:endParaRPr lang="en-US" dirty="0"/>
+          </a:p>
+        </p:txBody>
+      </p:sp>
+      <p:pic>
+        <p:nvPicPr>
+          <p:cNvPr id="4" name="Content Placeholder 3"/>
+          <p:cNvPicPr>
+            <a:picLocks noGrp="1" noChangeAspect="1"/>
+          </p:cNvPicPr>
+          <p:nvPr>
+            <p:ph sz="quarter" idx="10"/>
+          </p:nvPr>
+        </p:nvPicPr>
+        <p:blipFill>
+          <a:blip r:embed="rId2"/>
+          <a:stretch>
+            <a:fillRect/>
+          </a:stretch>
+        </p:blipFill>
+        <p:spPr>
+          <a:xfrm>
+            <a:off x="609480" y="1418400"/>
+            <a:ext cx="9746871" cy="3187760"/>
+          </a:xfrm>
+          <a:prstGeom prst="rect">
+            <a:avLst/>
+          </a:prstGeom>
+        </p:spPr>
+      </p:pic>
+      <p:pic>
+        <p:nvPicPr>
+          <p:cNvPr id="6" name="Picture 6" descr="https://www.w3schools.com/css/img_rwd_phone.jpg"/>
+          <p:cNvPicPr>
+            <a:picLocks noChangeAspect="1" noChangeArrowheads="1"/>
+          </p:cNvPicPr>
+          <p:nvPr/>
+        </p:nvPicPr>
+        <p:blipFill>
+          <a:blip r:embed="rId3">
+            <a:extLst>
+              <a:ext uri="{28A0092B-C50C-407E-A947-70E740481C1C}">
+                <a14:useLocalDpi xmlns:a14="http://schemas.microsoft.com/office/drawing/2010/main" val="0"/>
+              </a:ext>
+            </a:extLst>
+          </a:blip>
+          <a:srcRect/>
+          <a:stretch>
+            <a:fillRect/>
+          </a:stretch>
+        </p:blipFill>
+        <p:spPr bwMode="auto">
+          <a:xfrm>
+            <a:off x="3378398" y="4920070"/>
+            <a:ext cx="704850" cy="1362075"/>
+          </a:xfrm>
+          <a:prstGeom prst="rect">
+            <a:avLst/>
+          </a:prstGeom>
+          <a:noFill/>
+          <a:ln>
+            <a:solidFill>
+              <a:schemeClr val="tx2"/>
+            </a:solidFill>
+          </a:ln>
+          <a:extLst>
+            <a:ext uri="{909E8E84-426E-40DD-AFC4-6F175D3DCCD1}">
+              <a14:hiddenFill xmlns:a14="http://schemas.microsoft.com/office/drawing/2010/main">
+                <a:solidFill>
+                  <a:srgbClr val="FFFFFF"/>
+                </a:solidFill>
+              </a14:hiddenFill>
+            </a:ext>
+          </a:extLst>
+        </p:spPr>
+      </p:pic>
+      <p:pic>
+        <p:nvPicPr>
+          <p:cNvPr id="7" name="Picture 8" descr="https://www.w3schools.com/css/img_rwd_tablet.jpg"/>
+          <p:cNvPicPr>
+            <a:picLocks noChangeAspect="1" noChangeArrowheads="1"/>
+          </p:cNvPicPr>
+          <p:nvPr/>
+        </p:nvPicPr>
+        <p:blipFill>
+          <a:blip r:embed="rId4">
+            <a:extLst>
+              <a:ext uri="{28A0092B-C50C-407E-A947-70E740481C1C}">
+                <a14:useLocalDpi xmlns:a14="http://schemas.microsoft.com/office/drawing/2010/main" val="0"/>
+              </a:ext>
+            </a:extLst>
+          </a:blip>
+          <a:srcRect/>
+          <a:stretch>
+            <a:fillRect/>
+          </a:stretch>
+        </p:blipFill>
+        <p:spPr bwMode="auto">
+          <a:xfrm>
+            <a:off x="4330599" y="4001079"/>
+            <a:ext cx="1600200" cy="2286001"/>
+          </a:xfrm>
+          <a:prstGeom prst="rect">
+            <a:avLst/>
+          </a:prstGeom>
+          <a:noFill/>
+          <a:ln>
+            <a:solidFill>
+              <a:schemeClr val="tx2"/>
+            </a:solidFill>
+          </a:ln>
+          <a:extLst>
+            <a:ext uri="{909E8E84-426E-40DD-AFC4-6F175D3DCCD1}">
+              <a14:hiddenFill xmlns:a14="http://schemas.microsoft.com/office/drawing/2010/main">
+                <a:solidFill>
+                  <a:srgbClr val="FFFFFF"/>
+                </a:solidFill>
+              </a14:hiddenFill>
+            </a:ext>
+          </a:extLst>
+        </p:spPr>
+      </p:pic>
+      <p:pic>
+        <p:nvPicPr>
+          <p:cNvPr id="8" name="Picture 10" descr="https://www.w3schools.com/css/img_rwd_desktop.jpg"/>
+          <p:cNvPicPr>
+            <a:picLocks noChangeAspect="1" noChangeArrowheads="1"/>
+          </p:cNvPicPr>
+          <p:nvPr/>
+        </p:nvPicPr>
+        <p:blipFill>
+          <a:blip r:embed="rId5">
+            <a:extLst>
+              <a:ext uri="{28A0092B-C50C-407E-A947-70E740481C1C}">
+                <a14:useLocalDpi xmlns:a14="http://schemas.microsoft.com/office/drawing/2010/main" val="0"/>
+              </a:ext>
+            </a:extLst>
+          </a:blip>
+          <a:srcRect/>
+          <a:stretch>
+            <a:fillRect/>
+          </a:stretch>
+        </p:blipFill>
+        <p:spPr bwMode="auto">
+          <a:xfrm>
+            <a:off x="6178150" y="3329394"/>
+            <a:ext cx="4095750" cy="2952751"/>
+          </a:xfrm>
+          <a:prstGeom prst="rect">
+            <a:avLst/>
+          </a:prstGeom>
+          <a:noFill/>
+          <a:ln>
+            <a:solidFill>
+              <a:schemeClr val="tx2"/>
+            </a:solidFill>
+          </a:ln>
+          <a:extLst>
+            <a:ext uri="{909E8E84-426E-40DD-AFC4-6F175D3DCCD1}">
+              <a14:hiddenFill xmlns:a14="http://schemas.microsoft.com/office/drawing/2010/main">
+                <a:solidFill>
+                  <a:srgbClr val="FFFFFF"/>
+                </a:solidFill>
+              </a14:hiddenFill>
+            </a:ext>
+          </a:extLst>
+        </p:spPr>
+      </p:pic>
+    </p:spTree>
+    <p:extLst>
+      <p:ext uri="{BB962C8B-B14F-4D97-AF65-F5344CB8AC3E}">
+        <p14:creationId xmlns:p14="http://schemas.microsoft.com/office/powerpoint/2010/main" val="706860737"/>
+      </p:ext>
+    </p:extLst>
+  </p:cSld>
+  <p:clrMapOvr>
+    <a:masterClrMapping/>
+  </p:clrMapOvr>
+  <p:timing>
+    <p:tnLst>
+      <p:par>
+        <p:cTn id="1" dur="indefinite" restart="never" nodeType="tmRoot"/>
+      </p:par>
+    </p:tnLst>
+  </p:timing>
+</p:sld>
+</file>
+
+<file path=ppt/slides/slide13.xml><?xml version="1.0" encoding="utf-8"?>
+<p:sld xmlns:a="http://schemas.openxmlformats.org/drawingml/2006/main" xmlns:r="http://schemas.openxmlformats.org/officeDocument/2006/relationships" xmlns:p="http://schemas.openxmlformats.org/presentationml/2006/main">
+  <p:cSld>
+    <p:spTree>
+      <p:nvGrpSpPr>
+        <p:cNvPr id="1" name=""/>
+        <p:cNvGrpSpPr/>
+        <p:nvPr/>
+      </p:nvGrpSpPr>
+      <p:grpSpPr>
+        <a:xfrm>
+          <a:off x="0" y="0"/>
+          <a:ext cx="0" cy="0"/>
+          <a:chOff x="0" y="0"/>
+          <a:chExt cx="0" cy="0"/>
+        </a:xfrm>
+      </p:grpSpPr>
+      <p:sp>
+        <p:nvSpPr>
+          <p:cNvPr id="2" name="Title 1"/>
+          <p:cNvSpPr>
+            <a:spLocks noGrp="1"/>
+          </p:cNvSpPr>
+          <p:nvPr>
+            <p:ph type="title"/>
+          </p:nvPr>
+        </p:nvSpPr>
+        <p:spPr/>
+        <p:txBody>
+          <a:bodyPr/>
+          <a:lstStyle/>
+          <a:p>
+            <a:r>
+              <a:rPr lang="en-US" dirty="0" err="1" smtClean="0"/>
+              <a:t>Ve</a:t>
+            </a:r>
+            <a:r>
+              <a:rPr lang="sr-Latn-CS" dirty="0" smtClean="0"/>
+              <a:t>ž</a:t>
+            </a:r>
+            <a:r>
+              <a:rPr lang="en-US" dirty="0" smtClean="0"/>
+              <a:t>be</a:t>
+            </a:r>
+            <a:endParaRPr lang="en-US" dirty="0"/>
+          </a:p>
+        </p:txBody>
+      </p:sp>
+    </p:spTree>
+    <p:extLst>
+      <p:ext uri="{BB962C8B-B14F-4D97-AF65-F5344CB8AC3E}">
+        <p14:creationId xmlns:p14="http://schemas.microsoft.com/office/powerpoint/2010/main" val="2153955968"/>
+      </p:ext>
+    </p:extLst>
+  </p:cSld>
+  <p:clrMapOvr>
+    <a:masterClrMapping/>
+  </p:clrMapOvr>
+  <p:timing>
+    <p:tnLst>
+      <p:par>
+        <p:cTn id="1" dur="indefinite" restart="never" nodeType="tmRoot"/>
+      </p:par>
+    </p:tnLst>
+  </p:timing>
+</p:sld>
+</file>
+
+<file path=ppt/slides/slide14.xml><?xml version="1.0" encoding="utf-8"?>
+<p:sld xmlns:a="http://schemas.openxmlformats.org/drawingml/2006/main" xmlns:r="http://schemas.openxmlformats.org/officeDocument/2006/relationships" xmlns:p="http://schemas.openxmlformats.org/presentationml/2006/main">
+  <p:cSld>
+    <p:spTree>
+      <p:nvGrpSpPr>
+        <p:cNvPr id="1" name=""/>
+        <p:cNvGrpSpPr/>
+        <p:nvPr/>
+      </p:nvGrpSpPr>
+      <p:grpSpPr>
+        <a:xfrm>
+          <a:off x="0" y="0"/>
+          <a:ext cx="0" cy="0"/>
+          <a:chOff x="0" y="0"/>
+          <a:chExt cx="0" cy="0"/>
+        </a:xfrm>
+      </p:grpSpPr>
+      <p:sp>
+        <p:nvSpPr>
+          <p:cNvPr id="2" name="Title 1"/>
+          <p:cNvSpPr>
+            <a:spLocks noGrp="1"/>
+          </p:cNvSpPr>
+          <p:nvPr>
+            <p:ph type="title"/>
+          </p:nvPr>
+        </p:nvSpPr>
+        <p:spPr/>
+        <p:txBody>
+          <a:bodyPr/>
+          <a:lstStyle/>
+          <a:p>
+            <a:r>
+              <a:rPr lang="sr-Latn-CS" dirty="0" smtClean="0"/>
+              <a:t>Vežba 1</a:t>
+            </a:r>
+            <a:endParaRPr lang="en-US" dirty="0"/>
+          </a:p>
+        </p:txBody>
+      </p:sp>
+      <p:pic>
+        <p:nvPicPr>
+          <p:cNvPr id="4" name="Content Placeholder 3"/>
+          <p:cNvPicPr>
+            <a:picLocks noGrp="1" noChangeAspect="1"/>
+          </p:cNvPicPr>
+          <p:nvPr>
+            <p:ph sz="quarter" idx="10"/>
+          </p:nvPr>
+        </p:nvPicPr>
+        <p:blipFill rotWithShape="1">
+          <a:blip r:embed="rId2" cstate="print">
+            <a:extLst>
+              <a:ext uri="{28A0092B-C50C-407E-A947-70E740481C1C}">
+                <a14:useLocalDpi xmlns:a14="http://schemas.microsoft.com/office/drawing/2010/main" val="0"/>
+              </a:ext>
+            </a:extLst>
+          </a:blip>
+          <a:srcRect b="62516"/>
+          <a:stretch/>
+        </p:blipFill>
+        <p:spPr>
+          <a:xfrm>
+            <a:off x="609480" y="1418400"/>
+            <a:ext cx="9228988" cy="4612530"/>
+          </a:xfrm>
+        </p:spPr>
+      </p:pic>
+    </p:spTree>
+    <p:extLst>
+      <p:ext uri="{BB962C8B-B14F-4D97-AF65-F5344CB8AC3E}">
+        <p14:creationId xmlns:p14="http://schemas.microsoft.com/office/powerpoint/2010/main" val="1953357383"/>
       </p:ext>
     </p:extLst>
   </p:cSld>
@@ -7666,7 +8302,7 @@
           <p:nvPr>
             <p:extLst>
               <p:ext uri="{D42A27DB-BD31-4B8C-83A1-F6EECF244321}">
-                <p14:modId xmlns:p14="http://schemas.microsoft.com/office/powerpoint/2010/main" val="571710413"/>
+                <p14:modId xmlns:p14="http://schemas.microsoft.com/office/powerpoint/2010/main" val="2219585288"/>
               </p:ext>
             </p:extLst>
           </p:nvPr>
@@ -7743,7 +8379,7 @@
       </p:grpSpPr>
       <p:sp>
         <p:nvSpPr>
-          <p:cNvPr id="2" name="Title 1"/>
+          <p:cNvPr id="4" name="Title 3"/>
           <p:cNvSpPr>
             <a:spLocks noGrp="1"/>
           </p:cNvSpPr>
@@ -7757,72 +8393,51 @@
           <a:lstStyle/>
           <a:p>
             <a:r>
-              <a:rPr lang="en-US" smtClean="0"/>
-              <a:t>Ponavljanje je majka znanja </a:t>
-            </a:r>
-            <a:r>
-              <a:rPr lang="en-US" smtClean="0">
-                <a:sym typeface="Wingdings" panose="05000000000000000000" pitchFamily="2" charset="2"/>
-              </a:rPr>
-              <a:t></a:t>
-            </a:r>
-            <a:endParaRPr lang="sr-Latn-RS"/>
+              <a:rPr lang="en-US" dirty="0" smtClean="0"/>
+              <a:t>Dana</a:t>
+            </a:r>
+            <a:r>
+              <a:rPr lang="sr-Latn-CS" dirty="0" smtClean="0"/>
+              <a:t>šnje teme</a:t>
+            </a:r>
+            <a:endParaRPr lang="en-US" dirty="0"/>
           </a:p>
         </p:txBody>
       </p:sp>
       <p:sp>
         <p:nvSpPr>
-          <p:cNvPr id="3" name="Content Placeholder 2"/>
+          <p:cNvPr id="5" name="Content Placeholder 4"/>
           <p:cNvSpPr>
             <a:spLocks noGrp="1"/>
           </p:cNvSpPr>
           <p:nvPr>
-            <p:ph sz="half" idx="4294967295"/>
-          </p:nvPr>
-        </p:nvSpPr>
-        <p:spPr>
-          <a:xfrm>
-            <a:off x="0" y="1825625"/>
-            <a:ext cx="5570538" cy="4351338"/>
-          </a:xfrm>
-        </p:spPr>
+            <p:ph sz="quarter" idx="10"/>
+          </p:nvPr>
+        </p:nvSpPr>
+        <p:spPr/>
         <p:txBody>
           <a:bodyPr/>
           <a:lstStyle/>
           <a:p>
+            <a:r>
+              <a:rPr lang="en-US" dirty="0" smtClean="0"/>
+              <a:t>CSS frameworks</a:t>
+            </a:r>
+          </a:p>
+          <a:p>
             <a:pPr lvl="1"/>
-            <a:endParaRPr lang="en-US" smtClean="0"/>
+            <a:r>
+              <a:rPr lang="en-US" dirty="0" smtClean="0"/>
+              <a:t>Bootstrap</a:t>
+            </a:r>
+            <a:endParaRPr lang="en-US" dirty="0" smtClean="0"/>
           </a:p>
         </p:txBody>
       </p:sp>
-      <p:pic>
-        <p:nvPicPr>
-          <p:cNvPr id="9" name="Picture 8"/>
-          <p:cNvPicPr>
-            <a:picLocks noChangeAspect="1"/>
-          </p:cNvPicPr>
-          <p:nvPr/>
-        </p:nvPicPr>
-        <p:blipFill>
-          <a:blip r:embed="rId2"/>
-          <a:stretch>
-            <a:fillRect/>
-          </a:stretch>
-        </p:blipFill>
-        <p:spPr>
-          <a:xfrm>
-            <a:off x="10053638" y="4719332"/>
-            <a:ext cx="2138362" cy="2138362"/>
-          </a:xfrm>
-          <a:prstGeom prst="rect">
-            <a:avLst/>
-          </a:prstGeom>
-        </p:spPr>
-      </p:pic>
     </p:spTree>
     <p:extLst>
       <p:ext uri="{BB962C8B-B14F-4D97-AF65-F5344CB8AC3E}">
-        <p14:creationId xmlns:p14="http://schemas.microsoft.com/office/powerpoint/2010/main" val="4090671718"/>
+        <p14:creationId xmlns:p14="http://schemas.microsoft.com/office/powerpoint/2010/main" val="428666577"/>
       </p:ext>
     </p:extLst>
   </p:cSld>
@@ -7858,12 +8473,12 @@
       </p:grpSpPr>
       <p:sp>
         <p:nvSpPr>
-          <p:cNvPr id="5" name="Text Placeholder 4"/>
+          <p:cNvPr id="2" name="Title 1"/>
           <p:cNvSpPr>
             <a:spLocks noGrp="1"/>
           </p:cNvSpPr>
           <p:nvPr>
-            <p:ph type="body" sz="quarter" idx="10"/>
+            <p:ph type="title"/>
           </p:nvPr>
         </p:nvSpPr>
         <p:spPr/>
@@ -7872,46 +8487,498 @@
           <a:lstStyle/>
           <a:p>
             <a:r>
-              <a:rPr lang="en-US" smtClean="0"/>
-              <a:t>HTML</a:t>
-            </a:r>
-            <a:endParaRPr lang="sr-Latn-RS" smtClean="0"/>
+              <a:rPr lang="en-US" dirty="0" smtClean="0"/>
+              <a:t>CSS </a:t>
+            </a:r>
+            <a:r>
+              <a:rPr lang="en-US" dirty="0" smtClean="0"/>
+              <a:t>Frameworks</a:t>
+            </a:r>
+            <a:endParaRPr lang="en-US" dirty="0"/>
           </a:p>
         </p:txBody>
       </p:sp>
-      <p:sp>
-        <p:nvSpPr>
-          <p:cNvPr id="6" name="Text Placeholder 5"/>
+    </p:spTree>
+    <p:extLst>
+      <p:ext uri="{BB962C8B-B14F-4D97-AF65-F5344CB8AC3E}">
+        <p14:creationId xmlns:p14="http://schemas.microsoft.com/office/powerpoint/2010/main" val="424198968"/>
+      </p:ext>
+    </p:extLst>
+  </p:cSld>
+  <p:clrMapOvr>
+    <a:masterClrMapping/>
+  </p:clrMapOvr>
+  <p:timing>
+    <p:tnLst>
+      <p:par>
+        <p:cTn id="1" dur="indefinite" restart="never" nodeType="tmRoot"/>
+      </p:par>
+    </p:tnLst>
+  </p:timing>
+</p:sld>
+</file>
+
+<file path=ppt/slides/slide5.xml><?xml version="1.0" encoding="utf-8"?>
+<p:sld xmlns:a="http://schemas.openxmlformats.org/drawingml/2006/main" xmlns:r="http://schemas.openxmlformats.org/officeDocument/2006/relationships" xmlns:p="http://schemas.openxmlformats.org/presentationml/2006/main">
+  <p:cSld>
+    <p:spTree>
+      <p:nvGrpSpPr>
+        <p:cNvPr id="1" name=""/>
+        <p:cNvGrpSpPr/>
+        <p:nvPr/>
+      </p:nvGrpSpPr>
+      <p:grpSpPr>
+        <a:xfrm>
+          <a:off x="0" y="0"/>
+          <a:ext cx="0" cy="0"/>
+          <a:chOff x="0" y="0"/>
+          <a:chExt cx="0" cy="0"/>
+        </a:xfrm>
+      </p:grpSpPr>
+      <p:sp>
+        <p:nvSpPr>
+          <p:cNvPr id="5" name="Title 4"/>
           <p:cNvSpPr>
             <a:spLocks noGrp="1"/>
           </p:cNvSpPr>
           <p:nvPr>
-            <p:ph type="body" sz="quarter" idx="4294967295"/>
-          </p:nvPr>
-        </p:nvSpPr>
-        <p:spPr>
-          <a:xfrm>
-            <a:off x="7368309" y="3196013"/>
-            <a:ext cx="4699000" cy="1930400"/>
-          </a:xfrm>
-        </p:spPr>
+            <p:ph type="title"/>
+          </p:nvPr>
+        </p:nvSpPr>
+        <p:spPr/>
         <p:txBody>
           <a:bodyPr/>
           <a:lstStyle/>
           <a:p>
-            <a:pPr lvl="0"/>
-            <a:r>
-              <a:rPr lang="en-US" sz="4000" smtClean="0"/>
-              <a:t>text</a:t>
-            </a:r>
-            <a:endParaRPr lang="en-US" sz="4000"/>
+            <a:r>
+              <a:rPr lang="en-US" dirty="0" smtClean="0"/>
+              <a:t>Design grid</a:t>
+            </a:r>
+            <a:endParaRPr lang="en-US" dirty="0"/>
           </a:p>
         </p:txBody>
       </p:sp>
+      <p:pic>
+        <p:nvPicPr>
+          <p:cNvPr id="2050" name="Picture 2" descr="https://mdn.mozillademos.org/files/13408/flexbox-example2.png"/>
+          <p:cNvPicPr>
+            <a:picLocks noGrp="1" noChangeAspect="1" noChangeArrowheads="1"/>
+          </p:cNvPicPr>
+          <p:nvPr>
+            <p:ph sz="quarter" idx="10"/>
+          </p:nvPr>
+        </p:nvPicPr>
+        <p:blipFill>
+          <a:blip r:embed="rId2">
+            <a:extLst>
+              <a:ext uri="{28A0092B-C50C-407E-A947-70E740481C1C}">
+                <a14:useLocalDpi xmlns:a14="http://schemas.microsoft.com/office/drawing/2010/main" val="0"/>
+              </a:ext>
+            </a:extLst>
+          </a:blip>
+          <a:srcRect/>
+          <a:stretch>
+            <a:fillRect/>
+          </a:stretch>
+        </p:blipFill>
+        <p:spPr bwMode="auto">
+          <a:xfrm>
+            <a:off x="1313656" y="2032794"/>
+            <a:ext cx="7620000" cy="3314700"/>
+          </a:xfrm>
+          <a:prstGeom prst="rect">
+            <a:avLst/>
+          </a:prstGeom>
+          <a:noFill/>
+          <a:extLst>
+            <a:ext uri="{909E8E84-426E-40DD-AFC4-6F175D3DCCD1}">
+              <a14:hiddenFill xmlns:a14="http://schemas.microsoft.com/office/drawing/2010/main">
+                <a:solidFill>
+                  <a:srgbClr val="FFFFFF"/>
+                </a:solidFill>
+              </a14:hiddenFill>
+            </a:ext>
+          </a:extLst>
+        </p:spPr>
+      </p:pic>
     </p:spTree>
     <p:extLst>
       <p:ext uri="{BB962C8B-B14F-4D97-AF65-F5344CB8AC3E}">
-        <p14:creationId xmlns:p14="http://schemas.microsoft.com/office/powerpoint/2010/main" val="1530407426"/>
+        <p14:creationId xmlns:p14="http://schemas.microsoft.com/office/powerpoint/2010/main" val="3976683226"/>
+      </p:ext>
+    </p:extLst>
+  </p:cSld>
+  <p:clrMapOvr>
+    <a:masterClrMapping/>
+  </p:clrMapOvr>
+  <p:timing>
+    <p:tnLst>
+      <p:par>
+        <p:cTn id="1" dur="indefinite" restart="never" nodeType="tmRoot"/>
+      </p:par>
+    </p:tnLst>
+  </p:timing>
+</p:sld>
+</file>
+
+<file path=ppt/slides/slide6.xml><?xml version="1.0" encoding="utf-8"?>
+<p:sld xmlns:a="http://schemas.openxmlformats.org/drawingml/2006/main" xmlns:r="http://schemas.openxmlformats.org/officeDocument/2006/relationships" xmlns:p="http://schemas.openxmlformats.org/presentationml/2006/main">
+  <p:cSld>
+    <p:spTree>
+      <p:nvGrpSpPr>
+        <p:cNvPr id="1" name=""/>
+        <p:cNvGrpSpPr/>
+        <p:nvPr/>
+      </p:nvGrpSpPr>
+      <p:grpSpPr>
+        <a:xfrm>
+          <a:off x="0" y="0"/>
+          <a:ext cx="0" cy="0"/>
+          <a:chOff x="0" y="0"/>
+          <a:chExt cx="0" cy="0"/>
+        </a:xfrm>
+      </p:grpSpPr>
+      <p:sp>
+        <p:nvSpPr>
+          <p:cNvPr id="5" name="Title 4"/>
+          <p:cNvSpPr>
+            <a:spLocks noGrp="1"/>
+          </p:cNvSpPr>
+          <p:nvPr>
+            <p:ph type="title"/>
+          </p:nvPr>
+        </p:nvSpPr>
+        <p:spPr/>
+        <p:txBody>
+          <a:bodyPr/>
+          <a:lstStyle/>
+          <a:p>
+            <a:r>
+              <a:rPr lang="en-US" dirty="0" err="1" smtClean="0"/>
+              <a:t>Izdava</a:t>
+            </a:r>
+            <a:r>
+              <a:rPr lang="sr-Latn-CS" dirty="0" smtClean="0"/>
+              <a:t>štvo</a:t>
+            </a:r>
+            <a:endParaRPr lang="en-US" dirty="0"/>
+          </a:p>
+        </p:txBody>
+      </p:sp>
+      <p:pic>
+        <p:nvPicPr>
+          <p:cNvPr id="3" name="Content Placeholder 2"/>
+          <p:cNvPicPr>
+            <a:picLocks noGrp="1" noChangeAspect="1"/>
+          </p:cNvPicPr>
+          <p:nvPr>
+            <p:ph sz="quarter" idx="10"/>
+          </p:nvPr>
+        </p:nvPicPr>
+        <p:blipFill>
+          <a:blip r:embed="rId2">
+            <a:extLst>
+              <a:ext uri="{28A0092B-C50C-407E-A947-70E740481C1C}">
+                <a14:useLocalDpi xmlns:a14="http://schemas.microsoft.com/office/drawing/2010/main" val="0"/>
+              </a:ext>
+            </a:extLst>
+          </a:blip>
+          <a:stretch>
+            <a:fillRect/>
+          </a:stretch>
+        </p:blipFill>
+        <p:spPr>
+          <a:xfrm>
+            <a:off x="609480" y="1418400"/>
+            <a:ext cx="7887248" cy="4644712"/>
+          </a:xfrm>
+        </p:spPr>
+      </p:pic>
+    </p:spTree>
+    <p:extLst>
+      <p:ext uri="{BB962C8B-B14F-4D97-AF65-F5344CB8AC3E}">
+        <p14:creationId xmlns:p14="http://schemas.microsoft.com/office/powerpoint/2010/main" val="3928929416"/>
+      </p:ext>
+    </p:extLst>
+  </p:cSld>
+  <p:clrMapOvr>
+    <a:masterClrMapping/>
+  </p:clrMapOvr>
+  <p:timing>
+    <p:tnLst>
+      <p:par>
+        <p:cTn id="1" dur="indefinite" restart="never" nodeType="tmRoot"/>
+      </p:par>
+    </p:tnLst>
+  </p:timing>
+</p:sld>
+</file>
+
+<file path=ppt/slides/slide7.xml><?xml version="1.0" encoding="utf-8"?>
+<p:sld xmlns:a="http://schemas.openxmlformats.org/drawingml/2006/main" xmlns:r="http://schemas.openxmlformats.org/officeDocument/2006/relationships" xmlns:p="http://schemas.openxmlformats.org/presentationml/2006/main">
+  <p:cSld>
+    <p:spTree>
+      <p:nvGrpSpPr>
+        <p:cNvPr id="1" name=""/>
+        <p:cNvGrpSpPr/>
+        <p:nvPr/>
+      </p:nvGrpSpPr>
+      <p:grpSpPr>
+        <a:xfrm>
+          <a:off x="0" y="0"/>
+          <a:ext cx="0" cy="0"/>
+          <a:chOff x="0" y="0"/>
+          <a:chExt cx="0" cy="0"/>
+        </a:xfrm>
+      </p:grpSpPr>
+      <p:sp>
+        <p:nvSpPr>
+          <p:cNvPr id="5" name="Title 4"/>
+          <p:cNvSpPr>
+            <a:spLocks noGrp="1"/>
+          </p:cNvSpPr>
+          <p:nvPr>
+            <p:ph type="title"/>
+          </p:nvPr>
+        </p:nvSpPr>
+        <p:spPr/>
+        <p:txBody>
+          <a:bodyPr/>
+          <a:lstStyle/>
+          <a:p>
+            <a:r>
+              <a:rPr lang="sr-Latn-CS" dirty="0" smtClean="0"/>
+              <a:t>Arhitektura</a:t>
+            </a:r>
+            <a:endParaRPr lang="en-US" dirty="0"/>
+          </a:p>
+        </p:txBody>
+      </p:sp>
+      <p:pic>
+        <p:nvPicPr>
+          <p:cNvPr id="4" name="Content Placeholder 3"/>
+          <p:cNvPicPr>
+            <a:picLocks noGrp="1" noChangeAspect="1"/>
+          </p:cNvPicPr>
+          <p:nvPr>
+            <p:ph sz="quarter" idx="10"/>
+          </p:nvPr>
+        </p:nvPicPr>
+        <p:blipFill>
+          <a:blip r:embed="rId2">
+            <a:extLst>
+              <a:ext uri="{28A0092B-C50C-407E-A947-70E740481C1C}">
+                <a14:useLocalDpi xmlns:a14="http://schemas.microsoft.com/office/drawing/2010/main" val="0"/>
+              </a:ext>
+            </a:extLst>
+          </a:blip>
+          <a:stretch>
+            <a:fillRect/>
+          </a:stretch>
+        </p:blipFill>
+        <p:spPr>
+          <a:xfrm>
+            <a:off x="609480" y="1418400"/>
+            <a:ext cx="8264534" cy="4591982"/>
+          </a:xfrm>
+        </p:spPr>
+      </p:pic>
+    </p:spTree>
+    <p:extLst>
+      <p:ext uri="{BB962C8B-B14F-4D97-AF65-F5344CB8AC3E}">
+        <p14:creationId xmlns:p14="http://schemas.microsoft.com/office/powerpoint/2010/main" val="2274447549"/>
+      </p:ext>
+    </p:extLst>
+  </p:cSld>
+  <p:clrMapOvr>
+    <a:masterClrMapping/>
+  </p:clrMapOvr>
+  <p:timing>
+    <p:tnLst>
+      <p:par>
+        <p:cTn id="1" dur="indefinite" restart="never" nodeType="tmRoot"/>
+      </p:par>
+    </p:tnLst>
+  </p:timing>
+</p:sld>
+</file>
+
+<file path=ppt/slides/slide8.xml><?xml version="1.0" encoding="utf-8"?>
+<p:sld xmlns:a="http://schemas.openxmlformats.org/drawingml/2006/main" xmlns:r="http://schemas.openxmlformats.org/officeDocument/2006/relationships" xmlns:p="http://schemas.openxmlformats.org/presentationml/2006/main">
+  <p:cSld>
+    <p:spTree>
+      <p:nvGrpSpPr>
+        <p:cNvPr id="1" name=""/>
+        <p:cNvGrpSpPr/>
+        <p:nvPr/>
+      </p:nvGrpSpPr>
+      <p:grpSpPr>
+        <a:xfrm>
+          <a:off x="0" y="0"/>
+          <a:ext cx="0" cy="0"/>
+          <a:chOff x="0" y="0"/>
+          <a:chExt cx="0" cy="0"/>
+        </a:xfrm>
+      </p:grpSpPr>
+      <p:sp>
+        <p:nvSpPr>
+          <p:cNvPr id="5" name="Title 4"/>
+          <p:cNvSpPr>
+            <a:spLocks noGrp="1"/>
+          </p:cNvSpPr>
+          <p:nvPr>
+            <p:ph type="title"/>
+          </p:nvPr>
+        </p:nvSpPr>
+        <p:spPr/>
+        <p:txBody>
+          <a:bodyPr/>
+          <a:lstStyle/>
+          <a:p>
+            <a:r>
+              <a:rPr lang="sr-Latn-CS" dirty="0" smtClean="0"/>
+              <a:t>Grid</a:t>
+            </a:r>
+            <a:endParaRPr lang="en-US" dirty="0"/>
+          </a:p>
+        </p:txBody>
+      </p:sp>
+      <p:pic>
+        <p:nvPicPr>
+          <p:cNvPr id="9218" name="Picture 2" descr="https://mdn.mozillademos.org/files/13899/grid.png"/>
+          <p:cNvPicPr>
+            <a:picLocks noGrp="1" noChangeAspect="1" noChangeArrowheads="1"/>
+          </p:cNvPicPr>
+          <p:nvPr>
+            <p:ph sz="quarter" idx="10"/>
+          </p:nvPr>
+        </p:nvPicPr>
+        <p:blipFill>
+          <a:blip r:embed="rId2">
+            <a:extLst>
+              <a:ext uri="{28A0092B-C50C-407E-A947-70E740481C1C}">
+                <a14:useLocalDpi xmlns:a14="http://schemas.microsoft.com/office/drawing/2010/main" val="0"/>
+              </a:ext>
+            </a:extLst>
+          </a:blip>
+          <a:srcRect/>
+          <a:stretch>
+            <a:fillRect/>
+          </a:stretch>
+        </p:blipFill>
+        <p:spPr bwMode="auto">
+          <a:xfrm>
+            <a:off x="609479" y="1418400"/>
+            <a:ext cx="9709097" cy="4489240"/>
+          </a:xfrm>
+          <a:prstGeom prst="rect">
+            <a:avLst/>
+          </a:prstGeom>
+          <a:noFill/>
+          <a:extLst>
+            <a:ext uri="{909E8E84-426E-40DD-AFC4-6F175D3DCCD1}">
+              <a14:hiddenFill xmlns:a14="http://schemas.microsoft.com/office/drawing/2010/main">
+                <a:solidFill>
+                  <a:srgbClr val="FFFFFF"/>
+                </a:solidFill>
+              </a14:hiddenFill>
+            </a:ext>
+          </a:extLst>
+        </p:spPr>
+      </p:pic>
+    </p:spTree>
+    <p:extLst>
+      <p:ext uri="{BB962C8B-B14F-4D97-AF65-F5344CB8AC3E}">
+        <p14:creationId xmlns:p14="http://schemas.microsoft.com/office/powerpoint/2010/main" val="4204055485"/>
+      </p:ext>
+    </p:extLst>
+  </p:cSld>
+  <p:clrMapOvr>
+    <a:masterClrMapping/>
+  </p:clrMapOvr>
+  <p:timing>
+    <p:tnLst>
+      <p:par>
+        <p:cTn id="1" dur="indefinite" restart="never" nodeType="tmRoot"/>
+      </p:par>
+    </p:tnLst>
+  </p:timing>
+</p:sld>
+</file>
+
+<file path=ppt/slides/slide9.xml><?xml version="1.0" encoding="utf-8"?>
+<p:sld xmlns:a="http://schemas.openxmlformats.org/drawingml/2006/main" xmlns:r="http://schemas.openxmlformats.org/officeDocument/2006/relationships" xmlns:p="http://schemas.openxmlformats.org/presentationml/2006/main">
+  <p:cSld>
+    <p:spTree>
+      <p:nvGrpSpPr>
+        <p:cNvPr id="1" name=""/>
+        <p:cNvGrpSpPr/>
+        <p:nvPr/>
+      </p:nvGrpSpPr>
+      <p:grpSpPr>
+        <a:xfrm>
+          <a:off x="0" y="0"/>
+          <a:ext cx="0" cy="0"/>
+          <a:chOff x="0" y="0"/>
+          <a:chExt cx="0" cy="0"/>
+        </a:xfrm>
+      </p:grpSpPr>
+      <p:sp>
+        <p:nvSpPr>
+          <p:cNvPr id="5" name="Title 4"/>
+          <p:cNvSpPr>
+            <a:spLocks noGrp="1"/>
+          </p:cNvSpPr>
+          <p:nvPr>
+            <p:ph type="title"/>
+          </p:nvPr>
+        </p:nvSpPr>
+        <p:spPr/>
+        <p:txBody>
+          <a:bodyPr/>
+          <a:lstStyle/>
+          <a:p>
+            <a:r>
+              <a:rPr lang="sr-Latn-CS" dirty="0" smtClean="0"/>
+              <a:t>Grid</a:t>
+            </a:r>
+            <a:endParaRPr lang="en-US" dirty="0"/>
+          </a:p>
+        </p:txBody>
+      </p:sp>
+      <p:pic>
+        <p:nvPicPr>
+          <p:cNvPr id="3" name="Content Placeholder 2"/>
+          <p:cNvPicPr>
+            <a:picLocks noGrp="1" noChangeAspect="1"/>
+          </p:cNvPicPr>
+          <p:nvPr>
+            <p:ph sz="quarter" idx="10"/>
+          </p:nvPr>
+        </p:nvPicPr>
+        <p:blipFill>
+          <a:blip r:embed="rId2">
+            <a:extLst>
+              <a:ext uri="{28A0092B-C50C-407E-A947-70E740481C1C}">
+                <a14:useLocalDpi xmlns:a14="http://schemas.microsoft.com/office/drawing/2010/main" val="0"/>
+              </a:ext>
+            </a:extLst>
+          </a:blip>
+          <a:stretch>
+            <a:fillRect/>
+          </a:stretch>
+        </p:blipFill>
+        <p:spPr>
+          <a:xfrm>
+            <a:off x="3826763" y="1418400"/>
+            <a:ext cx="4537873" cy="4667528"/>
+          </a:xfrm>
+        </p:spPr>
+      </p:pic>
+    </p:spTree>
+    <p:extLst>
+      <p:ext uri="{BB962C8B-B14F-4D97-AF65-F5344CB8AC3E}">
+        <p14:creationId xmlns:p14="http://schemas.microsoft.com/office/powerpoint/2010/main" val="1508308506"/>
       </p:ext>
     </p:extLst>
   </p:cSld>

</xml_diff>